<commit_message>
Updated based on Chew-Yean's email
</commit_message>
<xml_diff>
--- a/IMDb Data Exploration & Machine Learning.pptx
+++ b/IMDb Data Exploration & Machine Learning.pptx
@@ -6,14 +6,19 @@
   </p:sldMasterIdLst>
   <p:sldIdLst>
     <p:sldId id="256" r:id="rId2"/>
-    <p:sldId id="257" r:id="rId3"/>
-    <p:sldId id="258" r:id="rId4"/>
-    <p:sldId id="260" r:id="rId5"/>
-    <p:sldId id="261" r:id="rId6"/>
-    <p:sldId id="262" r:id="rId7"/>
-    <p:sldId id="259" r:id="rId8"/>
-    <p:sldId id="263" r:id="rId9"/>
-    <p:sldId id="264" r:id="rId10"/>
+    <p:sldId id="268" r:id="rId3"/>
+    <p:sldId id="257" r:id="rId4"/>
+    <p:sldId id="258" r:id="rId5"/>
+    <p:sldId id="260" r:id="rId6"/>
+    <p:sldId id="261" r:id="rId7"/>
+    <p:sldId id="262" r:id="rId8"/>
+    <p:sldId id="259" r:id="rId9"/>
+    <p:sldId id="267" r:id="rId10"/>
+    <p:sldId id="269" r:id="rId11"/>
+    <p:sldId id="263" r:id="rId12"/>
+    <p:sldId id="264" r:id="rId13"/>
+    <p:sldId id="265" r:id="rId14"/>
+    <p:sldId id="266" r:id="rId15"/>
   </p:sldIdLst>
   <p:sldSz cx="12192000" cy="6858000"/>
   <p:notesSz cx="6858000" cy="9144000"/>
@@ -112,6 +117,11 @@
       </a:defRPr>
     </a:lvl9pPr>
   </p:defaultTextStyle>
+  <p:extLst>
+    <p:ext uri="{EFAFB233-063F-42B5-8137-9DF3F51BA10A}">
+      <p15:sldGuideLst xmlns:p15="http://schemas.microsoft.com/office/powerpoint/2012/main"/>
+    </p:ext>
+  </p:extLst>
 </p:presentation>
 </file>
 
@@ -3003,7 +3013,7 @@
           <a:p>
             <a:fld id="{7AEAFA0E-3B46-4DF2-A2F5-1F6A5DCBB37D}" type="datetimeFigureOut">
               <a:rPr lang="en-GB" smtClean="0"/>
-              <a:t>27/04/2017</a:t>
+              <a:t>28/04/2017</a:t>
             </a:fld>
             <a:endParaRPr lang="en-GB"/>
           </a:p>
@@ -3254,7 +3264,7 @@
           <a:p>
             <a:fld id="{7AEAFA0E-3B46-4DF2-A2F5-1F6A5DCBB37D}" type="datetimeFigureOut">
               <a:rPr lang="en-GB" smtClean="0"/>
-              <a:t>27/04/2017</a:t>
+              <a:t>28/04/2017</a:t>
             </a:fld>
             <a:endParaRPr lang="en-GB"/>
           </a:p>
@@ -3568,7 +3578,7 @@
           <a:p>
             <a:fld id="{7AEAFA0E-3B46-4DF2-A2F5-1F6A5DCBB37D}" type="datetimeFigureOut">
               <a:rPr lang="en-GB" smtClean="0"/>
-              <a:t>27/04/2017</a:t>
+              <a:t>28/04/2017</a:t>
             </a:fld>
             <a:endParaRPr lang="en-GB"/>
           </a:p>
@@ -3895,7 +3905,7 @@
           <a:p>
             <a:fld id="{7AEAFA0E-3B46-4DF2-A2F5-1F6A5DCBB37D}" type="datetimeFigureOut">
               <a:rPr lang="en-GB" smtClean="0"/>
-              <a:t>27/04/2017</a:t>
+              <a:t>28/04/2017</a:t>
             </a:fld>
             <a:endParaRPr lang="en-GB"/>
           </a:p>
@@ -4209,7 +4219,7 @@
           <a:p>
             <a:fld id="{7AEAFA0E-3B46-4DF2-A2F5-1F6A5DCBB37D}" type="datetimeFigureOut">
               <a:rPr lang="en-GB" smtClean="0"/>
-              <a:t>27/04/2017</a:t>
+              <a:t>28/04/2017</a:t>
             </a:fld>
             <a:endParaRPr lang="en-GB"/>
           </a:p>
@@ -4596,7 +4606,7 @@
           <a:p>
             <a:fld id="{7AEAFA0E-3B46-4DF2-A2F5-1F6A5DCBB37D}" type="datetimeFigureOut">
               <a:rPr lang="en-GB" smtClean="0"/>
-              <a:t>27/04/2017</a:t>
+              <a:t>28/04/2017</a:t>
             </a:fld>
             <a:endParaRPr lang="en-GB"/>
           </a:p>
@@ -4766,7 +4776,7 @@
           <a:p>
             <a:fld id="{7AEAFA0E-3B46-4DF2-A2F5-1F6A5DCBB37D}" type="datetimeFigureOut">
               <a:rPr lang="en-GB" smtClean="0"/>
-              <a:t>27/04/2017</a:t>
+              <a:t>28/04/2017</a:t>
             </a:fld>
             <a:endParaRPr lang="en-GB"/>
           </a:p>
@@ -4946,7 +4956,7 @@
           <a:p>
             <a:fld id="{7AEAFA0E-3B46-4DF2-A2F5-1F6A5DCBB37D}" type="datetimeFigureOut">
               <a:rPr lang="en-GB" smtClean="0"/>
-              <a:t>27/04/2017</a:t>
+              <a:t>28/04/2017</a:t>
             </a:fld>
             <a:endParaRPr lang="en-GB"/>
           </a:p>
@@ -5116,7 +5126,7 @@
           <a:p>
             <a:fld id="{7AEAFA0E-3B46-4DF2-A2F5-1F6A5DCBB37D}" type="datetimeFigureOut">
               <a:rPr lang="en-GB" smtClean="0"/>
-              <a:t>27/04/2017</a:t>
+              <a:t>28/04/2017</a:t>
             </a:fld>
             <a:endParaRPr lang="en-GB"/>
           </a:p>
@@ -5363,7 +5373,7 @@
           <a:p>
             <a:fld id="{7AEAFA0E-3B46-4DF2-A2F5-1F6A5DCBB37D}" type="datetimeFigureOut">
               <a:rPr lang="en-GB" smtClean="0"/>
-              <a:t>27/04/2017</a:t>
+              <a:t>28/04/2017</a:t>
             </a:fld>
             <a:endParaRPr lang="en-GB"/>
           </a:p>
@@ -5595,7 +5605,7 @@
           <a:p>
             <a:fld id="{7AEAFA0E-3B46-4DF2-A2F5-1F6A5DCBB37D}" type="datetimeFigureOut">
               <a:rPr lang="en-GB" smtClean="0"/>
-              <a:t>27/04/2017</a:t>
+              <a:t>28/04/2017</a:t>
             </a:fld>
             <a:endParaRPr lang="en-GB"/>
           </a:p>
@@ -5969,7 +5979,7 @@
           <a:p>
             <a:fld id="{7AEAFA0E-3B46-4DF2-A2F5-1F6A5DCBB37D}" type="datetimeFigureOut">
               <a:rPr lang="en-GB" smtClean="0"/>
-              <a:t>27/04/2017</a:t>
+              <a:t>28/04/2017</a:t>
             </a:fld>
             <a:endParaRPr lang="en-GB"/>
           </a:p>
@@ -6092,7 +6102,7 @@
           <a:p>
             <a:fld id="{7AEAFA0E-3B46-4DF2-A2F5-1F6A5DCBB37D}" type="datetimeFigureOut">
               <a:rPr lang="en-GB" smtClean="0"/>
-              <a:t>27/04/2017</a:t>
+              <a:t>28/04/2017</a:t>
             </a:fld>
             <a:endParaRPr lang="en-GB"/>
           </a:p>
@@ -6187,7 +6197,7 @@
           <a:p>
             <a:fld id="{7AEAFA0E-3B46-4DF2-A2F5-1F6A5DCBB37D}" type="datetimeFigureOut">
               <a:rPr lang="en-GB" smtClean="0"/>
-              <a:t>27/04/2017</a:t>
+              <a:t>28/04/2017</a:t>
             </a:fld>
             <a:endParaRPr lang="en-GB"/>
           </a:p>
@@ -6442,7 +6452,7 @@
           <a:p>
             <a:fld id="{7AEAFA0E-3B46-4DF2-A2F5-1F6A5DCBB37D}" type="datetimeFigureOut">
               <a:rPr lang="en-GB" smtClean="0"/>
-              <a:t>27/04/2017</a:t>
+              <a:t>28/04/2017</a:t>
             </a:fld>
             <a:endParaRPr lang="en-GB"/>
           </a:p>
@@ -6705,7 +6715,7 @@
           <a:p>
             <a:fld id="{7AEAFA0E-3B46-4DF2-A2F5-1F6A5DCBB37D}" type="datetimeFigureOut">
               <a:rPr lang="en-GB" smtClean="0"/>
-              <a:t>27/04/2017</a:t>
+              <a:t>28/04/2017</a:t>
             </a:fld>
             <a:endParaRPr lang="en-GB"/>
           </a:p>
@@ -7450,7 +7460,7 @@
           <a:p>
             <a:fld id="{7AEAFA0E-3B46-4DF2-A2F5-1F6A5DCBB37D}" type="datetimeFigureOut">
               <a:rPr lang="en-GB" smtClean="0"/>
-              <a:t>27/04/2017</a:t>
+              <a:t>28/04/2017</a:t>
             </a:fld>
             <a:endParaRPr lang="en-GB"/>
           </a:p>
@@ -8035,8 +8045,29 @@
           <a:p>
             <a:r>
               <a:rPr lang="en-GB" dirty="0"/>
-              <a:t>Katie Winkle</a:t>
-            </a:r>
+              <a:t>Katie Winkle, </a:t>
+            </a:r>
+            <a:r>
+              <a:rPr lang="en-GB" dirty="0" err="1"/>
+              <a:t>Katja</a:t>
+            </a:r>
+            <a:r>
+              <a:rPr lang="en-GB" dirty="0"/>
+              <a:t> </a:t>
+            </a:r>
+            <a:r>
+              <a:rPr lang="en-GB" dirty="0" err="1"/>
+              <a:t>Durrani</a:t>
+            </a:r>
+            <a:r>
+              <a:rPr lang="en-GB" dirty="0"/>
+              <a:t> &amp; Vivienne </a:t>
+            </a:r>
+            <a:r>
+              <a:rPr lang="en-GB" dirty="0" err="1"/>
+              <a:t>Kuh</a:t>
+            </a:r>
+            <a:endParaRPr lang="en-GB" dirty="0"/>
           </a:p>
           <a:p>
             <a:r>
@@ -8050,6 +8081,725 @@
     <p:extLst>
       <p:ext uri="{BB962C8B-B14F-4D97-AF65-F5344CB8AC3E}">
         <p14:creationId xmlns:p14="http://schemas.microsoft.com/office/powerpoint/2010/main" val="63687526"/>
+      </p:ext>
+    </p:extLst>
+  </p:cSld>
+  <p:clrMapOvr>
+    <a:masterClrMapping/>
+  </p:clrMapOvr>
+</p:sld>
+</file>
+
+<file path=ppt/slides/slide10.xml><?xml version="1.0" encoding="utf-8"?>
+<p:sld xmlns:a="http://schemas.openxmlformats.org/drawingml/2006/main" xmlns:r="http://schemas.openxmlformats.org/officeDocument/2006/relationships" xmlns:p="http://schemas.openxmlformats.org/presentationml/2006/main">
+  <p:cSld>
+    <p:spTree>
+      <p:nvGrpSpPr>
+        <p:cNvPr id="1" name=""/>
+        <p:cNvGrpSpPr/>
+        <p:nvPr/>
+      </p:nvGrpSpPr>
+      <p:grpSpPr>
+        <a:xfrm>
+          <a:off x="0" y="0"/>
+          <a:ext cx="0" cy="0"/>
+          <a:chOff x="0" y="0"/>
+          <a:chExt cx="0" cy="0"/>
+        </a:xfrm>
+      </p:grpSpPr>
+      <p:sp>
+        <p:nvSpPr>
+          <p:cNvPr id="2" name="Title 1"/>
+          <p:cNvSpPr>
+            <a:spLocks noGrp="1"/>
+          </p:cNvSpPr>
+          <p:nvPr>
+            <p:ph type="title"/>
+          </p:nvPr>
+        </p:nvSpPr>
+        <p:spPr/>
+        <p:txBody>
+          <a:bodyPr/>
+          <a:lstStyle/>
+          <a:p>
+            <a:r>
+              <a:rPr lang="en-GB" dirty="0"/>
+              <a:t>So can we predict Facebook likes?</a:t>
+            </a:r>
+            <a:br>
+              <a:rPr lang="en-GB" dirty="0"/>
+            </a:br>
+            <a:r>
+              <a:rPr lang="en-GB" dirty="0"/>
+              <a:t>Final KNN &amp; Reflections</a:t>
+            </a:r>
+          </a:p>
+        </p:txBody>
+      </p:sp>
+      <p:sp>
+        <p:nvSpPr>
+          <p:cNvPr id="3" name="Content Placeholder 2"/>
+          <p:cNvSpPr>
+            <a:spLocks noGrp="1"/>
+          </p:cNvSpPr>
+          <p:nvPr>
+            <p:ph idx="1"/>
+          </p:nvPr>
+        </p:nvSpPr>
+        <p:spPr/>
+        <p:txBody>
+          <a:bodyPr/>
+          <a:lstStyle/>
+          <a:p>
+            <a:r>
+              <a:rPr lang="en-GB" dirty="0"/>
+              <a:t>Final data features used by classifier:</a:t>
+            </a:r>
+          </a:p>
+          <a:p>
+            <a:pPr lvl="1"/>
+            <a:r>
+              <a:rPr lang="en-GB" dirty="0"/>
+              <a:t>Number of critic reviews</a:t>
+            </a:r>
+          </a:p>
+          <a:p>
+            <a:pPr lvl="1"/>
+            <a:r>
+              <a:rPr lang="en-GB" dirty="0"/>
+              <a:t>Number of users who’ve voted</a:t>
+            </a:r>
+          </a:p>
+          <a:p>
+            <a:pPr lvl="1"/>
+            <a:r>
+              <a:rPr lang="en-GB" dirty="0"/>
+              <a:t>Number of users who’ve left reviews</a:t>
+            </a:r>
+          </a:p>
+          <a:p>
+            <a:r>
+              <a:rPr lang="en-GB" dirty="0"/>
+              <a:t>Can predict Facebook like label (H-M-L) with accuracy of ~68%</a:t>
+            </a:r>
+          </a:p>
+          <a:p>
+            <a:endParaRPr lang="en-GB" dirty="0"/>
+          </a:p>
+          <a:p>
+            <a:r>
+              <a:rPr lang="en-GB" dirty="0"/>
+              <a:t>Suggests IMDb user behaviour somewhat reflective of Facebook user behaviour</a:t>
+            </a:r>
+          </a:p>
+          <a:p>
+            <a:pPr lvl="1"/>
+            <a:r>
+              <a:rPr lang="en-GB" dirty="0"/>
+              <a:t>Overlapping demographics in IMDb &amp; Facebook users</a:t>
+            </a:r>
+          </a:p>
+          <a:p>
+            <a:pPr lvl="1"/>
+            <a:r>
+              <a:rPr lang="en-GB" dirty="0"/>
+              <a:t>IMDb users are a good test case for predicting film popularity</a:t>
+            </a:r>
+          </a:p>
+        </p:txBody>
+      </p:sp>
+    </p:spTree>
+    <p:extLst>
+      <p:ext uri="{BB962C8B-B14F-4D97-AF65-F5344CB8AC3E}">
+        <p14:creationId xmlns:p14="http://schemas.microsoft.com/office/powerpoint/2010/main" val="3168869937"/>
+      </p:ext>
+    </p:extLst>
+  </p:cSld>
+  <p:clrMapOvr>
+    <a:masterClrMapping/>
+  </p:clrMapOvr>
+</p:sld>
+</file>
+
+<file path=ppt/slides/slide11.xml><?xml version="1.0" encoding="utf-8"?>
+<p:sld xmlns:a="http://schemas.openxmlformats.org/drawingml/2006/main" xmlns:r="http://schemas.openxmlformats.org/officeDocument/2006/relationships" xmlns:p="http://schemas.openxmlformats.org/presentationml/2006/main">
+  <p:cSld>
+    <p:spTree>
+      <p:nvGrpSpPr>
+        <p:cNvPr id="1" name=""/>
+        <p:cNvGrpSpPr/>
+        <p:nvPr/>
+      </p:nvGrpSpPr>
+      <p:grpSpPr>
+        <a:xfrm>
+          <a:off x="0" y="0"/>
+          <a:ext cx="0" cy="0"/>
+          <a:chOff x="0" y="0"/>
+          <a:chExt cx="0" cy="0"/>
+        </a:xfrm>
+      </p:grpSpPr>
+      <p:sp>
+        <p:nvSpPr>
+          <p:cNvPr id="2" name="Title 1"/>
+          <p:cNvSpPr>
+            <a:spLocks noGrp="1"/>
+          </p:cNvSpPr>
+          <p:nvPr>
+            <p:ph type="title"/>
+          </p:nvPr>
+        </p:nvSpPr>
+        <p:spPr/>
+        <p:txBody>
+          <a:bodyPr/>
+          <a:lstStyle/>
+          <a:p>
+            <a:r>
+              <a:rPr lang="en-GB" dirty="0"/>
+              <a:t>How good </a:t>
+            </a:r>
+            <a:r>
+              <a:rPr lang="en-GB" i="1" dirty="0"/>
+              <a:t>really </a:t>
+            </a:r>
+            <a:r>
+              <a:rPr lang="en-GB" dirty="0"/>
+              <a:t>is it?</a:t>
+            </a:r>
+            <a:br>
+              <a:rPr lang="en-GB" dirty="0"/>
+            </a:br>
+            <a:r>
+              <a:rPr lang="en-GB" dirty="0"/>
+              <a:t>Comparing to ‘Chance’</a:t>
+            </a:r>
+          </a:p>
+        </p:txBody>
+      </p:sp>
+      <p:sp>
+        <p:nvSpPr>
+          <p:cNvPr id="3" name="Content Placeholder 2"/>
+          <p:cNvSpPr>
+            <a:spLocks noGrp="1"/>
+          </p:cNvSpPr>
+          <p:nvPr>
+            <p:ph idx="1"/>
+          </p:nvPr>
+        </p:nvSpPr>
+        <p:spPr>
+          <a:xfrm>
+            <a:off x="677334" y="1953195"/>
+            <a:ext cx="8596668" cy="3880773"/>
+          </a:xfrm>
+        </p:spPr>
+        <p:txBody>
+          <a:bodyPr/>
+          <a:lstStyle/>
+          <a:p>
+            <a:r>
+              <a:rPr lang="en-GB" dirty="0"/>
+              <a:t>Pure classifier accuracy isn’t always enough</a:t>
+            </a:r>
+          </a:p>
+          <a:p>
+            <a:pPr lvl="1"/>
+            <a:r>
+              <a:rPr lang="en-GB" dirty="0"/>
+              <a:t>Breast cancer recurrence: always predicting no would be 70% accurate</a:t>
+            </a:r>
+            <a:r>
+              <a:rPr lang="en-GB" baseline="30000" dirty="0"/>
+              <a:t>1</a:t>
+            </a:r>
+          </a:p>
+          <a:p>
+            <a:r>
+              <a:rPr lang="en-GB" dirty="0"/>
+              <a:t>In the Facebook like case, always guessing ‘Medium’ would be ~50% accurate</a:t>
+            </a:r>
+          </a:p>
+          <a:p>
+            <a:pPr lvl="1"/>
+            <a:r>
+              <a:rPr lang="en-GB" dirty="0"/>
+              <a:t>Initially caught us out, you would expect ‘chance’ to be 33% as 3 possible labels</a:t>
+            </a:r>
+          </a:p>
+        </p:txBody>
+      </p:sp>
+      <p:graphicFrame>
+        <p:nvGraphicFramePr>
+          <p:cNvPr id="5" name="Chart 4">
+            <a:extLst>
+              <a:ext uri="{FF2B5EF4-FFF2-40B4-BE49-F238E27FC236}">
+                <a16:creationId xmlns:a16="http://schemas.microsoft.com/office/drawing/2014/main" id="{FC9F8783-F62F-432E-BC26-982FD23AB1E0}"/>
+              </a:ext>
+            </a:extLst>
+          </p:cNvPr>
+          <p:cNvGraphicFramePr>
+            <a:graphicFrameLocks/>
+          </p:cNvGraphicFramePr>
+          <p:nvPr>
+            <p:extLst>
+              <p:ext uri="{D42A27DB-BD31-4B8C-83A1-F6EECF244321}">
+                <p14:modId xmlns:p14="http://schemas.microsoft.com/office/powerpoint/2010/main" val="3446984407"/>
+              </p:ext>
+            </p:extLst>
+          </p:nvPr>
+        </p:nvGraphicFramePr>
+        <p:xfrm>
+          <a:off x="2689668" y="3514974"/>
+          <a:ext cx="4572000" cy="2743200"/>
+        </p:xfrm>
+        <a:graphic>
+          <a:graphicData uri="http://schemas.openxmlformats.org/drawingml/2006/chart">
+            <c:chart xmlns:c="http://schemas.openxmlformats.org/drawingml/2006/chart" xmlns:r="http://schemas.openxmlformats.org/officeDocument/2006/relationships" r:id="rId2"/>
+          </a:graphicData>
+        </a:graphic>
+      </p:graphicFrame>
+      <p:sp>
+        <p:nvSpPr>
+          <p:cNvPr id="6" name="TextBox 5"/>
+          <p:cNvSpPr txBox="1"/>
+          <p:nvPr/>
+        </p:nvSpPr>
+        <p:spPr>
+          <a:xfrm>
+            <a:off x="677334" y="6484420"/>
+            <a:ext cx="7747634" cy="261610"/>
+          </a:xfrm>
+          <a:prstGeom prst="rect">
+            <a:avLst/>
+          </a:prstGeom>
+          <a:noFill/>
+        </p:spPr>
+        <p:txBody>
+          <a:bodyPr wrap="none" rtlCol="0">
+            <a:spAutoFit/>
+          </a:bodyPr>
+          <a:lstStyle/>
+          <a:p>
+            <a:r>
+              <a:rPr lang="en-GB" sz="1100" baseline="30000" dirty="0"/>
+              <a:t>1</a:t>
+            </a:r>
+            <a:r>
+              <a:rPr lang="en-GB" sz="1100" dirty="0"/>
+              <a:t>http://machinelearningmastery.com/classification-accuracy-is-not-enough-more-performance-measures-you-can-use/</a:t>
+            </a:r>
+          </a:p>
+        </p:txBody>
+      </p:sp>
+    </p:spTree>
+    <p:extLst>
+      <p:ext uri="{BB962C8B-B14F-4D97-AF65-F5344CB8AC3E}">
+        <p14:creationId xmlns:p14="http://schemas.microsoft.com/office/powerpoint/2010/main" val="1919603595"/>
+      </p:ext>
+    </p:extLst>
+  </p:cSld>
+  <p:clrMapOvr>
+    <a:masterClrMapping/>
+  </p:clrMapOvr>
+</p:sld>
+</file>
+
+<file path=ppt/slides/slide12.xml><?xml version="1.0" encoding="utf-8"?>
+<p:sld xmlns:a="http://schemas.openxmlformats.org/drawingml/2006/main" xmlns:r="http://schemas.openxmlformats.org/officeDocument/2006/relationships" xmlns:p="http://schemas.openxmlformats.org/presentationml/2006/main">
+  <p:cSld>
+    <p:spTree>
+      <p:nvGrpSpPr>
+        <p:cNvPr id="1" name=""/>
+        <p:cNvGrpSpPr/>
+        <p:nvPr/>
+      </p:nvGrpSpPr>
+      <p:grpSpPr>
+        <a:xfrm>
+          <a:off x="0" y="0"/>
+          <a:ext cx="0" cy="0"/>
+          <a:chOff x="0" y="0"/>
+          <a:chExt cx="0" cy="0"/>
+        </a:xfrm>
+      </p:grpSpPr>
+      <p:sp>
+        <p:nvSpPr>
+          <p:cNvPr id="2" name="Title 1"/>
+          <p:cNvSpPr>
+            <a:spLocks noGrp="1"/>
+          </p:cNvSpPr>
+          <p:nvPr>
+            <p:ph type="title"/>
+          </p:nvPr>
+        </p:nvSpPr>
+        <p:spPr/>
+        <p:txBody>
+          <a:bodyPr/>
+          <a:lstStyle/>
+          <a:p>
+            <a:r>
+              <a:rPr lang="en-GB" dirty="0"/>
+              <a:t>How else can we check?</a:t>
+            </a:r>
+            <a:br>
+              <a:rPr lang="en-GB" dirty="0"/>
+            </a:br>
+            <a:r>
+              <a:rPr lang="en-GB" dirty="0"/>
+              <a:t>Confusion Matrix</a:t>
+            </a:r>
+          </a:p>
+        </p:txBody>
+      </p:sp>
+      <p:sp>
+        <p:nvSpPr>
+          <p:cNvPr id="5" name="Content Placeholder 4"/>
+          <p:cNvSpPr>
+            <a:spLocks noGrp="1"/>
+          </p:cNvSpPr>
+          <p:nvPr>
+            <p:ph sz="half" idx="1"/>
+          </p:nvPr>
+        </p:nvSpPr>
+        <p:spPr>
+          <a:xfrm>
+            <a:off x="677334" y="2525973"/>
+            <a:ext cx="4184035" cy="3515388"/>
+          </a:xfrm>
+        </p:spPr>
+        <p:txBody>
+          <a:bodyPr/>
+          <a:lstStyle/>
+          <a:p>
+            <a:r>
+              <a:rPr lang="en-GB" dirty="0"/>
+              <a:t>Shows misclassifications by label</a:t>
+            </a:r>
+          </a:p>
+          <a:p>
+            <a:r>
+              <a:rPr lang="en-GB" dirty="0"/>
+              <a:t>Reflections:</a:t>
+            </a:r>
+          </a:p>
+          <a:p>
+            <a:pPr lvl="1"/>
+            <a:r>
+              <a:rPr lang="en-GB" dirty="0"/>
+              <a:t>High &amp; low rarely confused</a:t>
+            </a:r>
+          </a:p>
+          <a:p>
+            <a:pPr lvl="1"/>
+            <a:r>
+              <a:rPr lang="en-GB" dirty="0"/>
+              <a:t>Most often correct on medium films -&gt; reflection of data set as discussed </a:t>
+            </a:r>
+            <a:r>
+              <a:rPr lang="en-GB" dirty="0" err="1"/>
+              <a:t>prev</a:t>
+            </a:r>
+            <a:r>
+              <a:rPr lang="en-GB" dirty="0"/>
+              <a:t>?</a:t>
+            </a:r>
+          </a:p>
+          <a:p>
+            <a:pPr lvl="1"/>
+            <a:endParaRPr lang="en-GB" dirty="0"/>
+          </a:p>
+        </p:txBody>
+      </p:sp>
+      <p:pic>
+        <p:nvPicPr>
+          <p:cNvPr id="13" name="Content Placeholder 12"/>
+          <p:cNvPicPr>
+            <a:picLocks noGrp="1" noChangeAspect="1"/>
+          </p:cNvPicPr>
+          <p:nvPr>
+            <p:ph sz="half" idx="2"/>
+          </p:nvPr>
+        </p:nvPicPr>
+        <p:blipFill rotWithShape="1">
+          <a:blip r:embed="rId2"/>
+          <a:srcRect l="14584" t="30371" r="42833" b="11908"/>
+          <a:stretch/>
+        </p:blipFill>
+        <p:spPr>
+          <a:xfrm>
+            <a:off x="5089525" y="2505981"/>
+            <a:ext cx="4184650" cy="3190650"/>
+          </a:xfrm>
+          <a:prstGeom prst="rect">
+            <a:avLst/>
+          </a:prstGeom>
+        </p:spPr>
+      </p:pic>
+    </p:spTree>
+    <p:extLst>
+      <p:ext uri="{BB962C8B-B14F-4D97-AF65-F5344CB8AC3E}">
+        <p14:creationId xmlns:p14="http://schemas.microsoft.com/office/powerpoint/2010/main" val="3867991754"/>
+      </p:ext>
+    </p:extLst>
+  </p:cSld>
+  <p:clrMapOvr>
+    <a:masterClrMapping/>
+  </p:clrMapOvr>
+</p:sld>
+</file>
+
+<file path=ppt/slides/slide13.xml><?xml version="1.0" encoding="utf-8"?>
+<p:sld xmlns:a="http://schemas.openxmlformats.org/drawingml/2006/main" xmlns:r="http://schemas.openxmlformats.org/officeDocument/2006/relationships" xmlns:p="http://schemas.openxmlformats.org/presentationml/2006/main">
+  <p:cSld>
+    <p:spTree>
+      <p:nvGrpSpPr>
+        <p:cNvPr id="1" name=""/>
+        <p:cNvGrpSpPr/>
+        <p:nvPr/>
+      </p:nvGrpSpPr>
+      <p:grpSpPr>
+        <a:xfrm>
+          <a:off x="0" y="0"/>
+          <a:ext cx="0" cy="0"/>
+          <a:chOff x="0" y="0"/>
+          <a:chExt cx="0" cy="0"/>
+        </a:xfrm>
+      </p:grpSpPr>
+      <p:sp>
+        <p:nvSpPr>
+          <p:cNvPr id="5" name="Title 4"/>
+          <p:cNvSpPr>
+            <a:spLocks noGrp="1"/>
+          </p:cNvSpPr>
+          <p:nvPr>
+            <p:ph type="title"/>
+          </p:nvPr>
+        </p:nvSpPr>
+        <p:spPr/>
+        <p:txBody>
+          <a:bodyPr/>
+          <a:lstStyle/>
+          <a:p>
+            <a:r>
+              <a:rPr lang="en-GB" dirty="0"/>
+              <a:t>So what did we learn?</a:t>
+            </a:r>
+            <a:br>
+              <a:rPr lang="en-GB" dirty="0"/>
+            </a:br>
+            <a:endParaRPr lang="en-GB" dirty="0"/>
+          </a:p>
+        </p:txBody>
+      </p:sp>
+      <p:sp>
+        <p:nvSpPr>
+          <p:cNvPr id="6" name="Content Placeholder 5"/>
+          <p:cNvSpPr>
+            <a:spLocks noGrp="1"/>
+          </p:cNvSpPr>
+          <p:nvPr>
+            <p:ph idx="1"/>
+          </p:nvPr>
+        </p:nvSpPr>
+        <p:spPr/>
+        <p:txBody>
+          <a:bodyPr>
+            <a:normAutofit/>
+          </a:bodyPr>
+          <a:lstStyle/>
+          <a:p>
+            <a:r>
+              <a:rPr lang="en-GB" dirty="0"/>
+              <a:t>Importance of pre-processing of data (non-trivial)</a:t>
+            </a:r>
+          </a:p>
+          <a:p>
+            <a:pPr lvl="1"/>
+            <a:r>
+              <a:rPr lang="en-GB" dirty="0"/>
+              <a:t>Missing/incorrect entries</a:t>
+            </a:r>
+          </a:p>
+          <a:p>
+            <a:pPr lvl="1"/>
+            <a:r>
+              <a:rPr lang="en-GB" dirty="0"/>
+              <a:t>Qualitative data</a:t>
+            </a:r>
+          </a:p>
+          <a:p>
+            <a:pPr lvl="1"/>
+            <a:r>
+              <a:rPr lang="en-GB" dirty="0"/>
+              <a:t>Demonstrated accuracy improvement</a:t>
+            </a:r>
+          </a:p>
+          <a:p>
+            <a:r>
+              <a:rPr lang="en-GB" dirty="0"/>
+              <a:t>Data exploration, understanding &amp; feature selection is vital</a:t>
+            </a:r>
+          </a:p>
+          <a:p>
+            <a:pPr lvl="1"/>
+            <a:r>
+              <a:rPr lang="en-GB" dirty="0"/>
+              <a:t>Demonstrated accuracy improvement</a:t>
+            </a:r>
+          </a:p>
+          <a:p>
+            <a:pPr lvl="1"/>
+            <a:r>
+              <a:rPr lang="en-GB" dirty="0"/>
+              <a:t>Also allows for meaningful reflections at this stage</a:t>
+            </a:r>
+          </a:p>
+          <a:p>
+            <a:pPr lvl="1"/>
+            <a:r>
+              <a:rPr lang="en-GB" dirty="0"/>
+              <a:t>Understanding data spread important for then assessing predictor performance</a:t>
+            </a:r>
+          </a:p>
+          <a:p>
+            <a:r>
+              <a:rPr lang="en-GB" dirty="0"/>
+              <a:t>Classification accuracy is not always the best performance indicator</a:t>
+            </a:r>
+          </a:p>
+          <a:p>
+            <a:pPr lvl="1"/>
+            <a:r>
+              <a:rPr lang="en-GB" dirty="0"/>
+              <a:t>Confusion matrix one example of an alternative</a:t>
+            </a:r>
+          </a:p>
+          <a:p>
+            <a:pPr lvl="1"/>
+            <a:endParaRPr lang="en-GB" dirty="0"/>
+          </a:p>
+        </p:txBody>
+      </p:sp>
+    </p:spTree>
+    <p:extLst>
+      <p:ext uri="{BB962C8B-B14F-4D97-AF65-F5344CB8AC3E}">
+        <p14:creationId xmlns:p14="http://schemas.microsoft.com/office/powerpoint/2010/main" val="1419737940"/>
+      </p:ext>
+    </p:extLst>
+  </p:cSld>
+  <p:clrMapOvr>
+    <a:masterClrMapping/>
+  </p:clrMapOvr>
+</p:sld>
+</file>
+
+<file path=ppt/slides/slide14.xml><?xml version="1.0" encoding="utf-8"?>
+<p:sld xmlns:a="http://schemas.openxmlformats.org/drawingml/2006/main" xmlns:r="http://schemas.openxmlformats.org/officeDocument/2006/relationships" xmlns:p="http://schemas.openxmlformats.org/presentationml/2006/main">
+  <p:cSld>
+    <p:spTree>
+      <p:nvGrpSpPr>
+        <p:cNvPr id="1" name=""/>
+        <p:cNvGrpSpPr/>
+        <p:nvPr/>
+      </p:nvGrpSpPr>
+      <p:grpSpPr>
+        <a:xfrm>
+          <a:off x="0" y="0"/>
+          <a:ext cx="0" cy="0"/>
+          <a:chOff x="0" y="0"/>
+          <a:chExt cx="0" cy="0"/>
+        </a:xfrm>
+      </p:grpSpPr>
+      <p:sp>
+        <p:nvSpPr>
+          <p:cNvPr id="2" name="Title 1"/>
+          <p:cNvSpPr>
+            <a:spLocks noGrp="1"/>
+          </p:cNvSpPr>
+          <p:nvPr>
+            <p:ph type="title"/>
+          </p:nvPr>
+        </p:nvSpPr>
+        <p:spPr/>
+        <p:txBody>
+          <a:bodyPr/>
+          <a:lstStyle/>
+          <a:p>
+            <a:r>
+              <a:rPr lang="en-GB" dirty="0"/>
+              <a:t>What would we ask next?</a:t>
+            </a:r>
+          </a:p>
+        </p:txBody>
+      </p:sp>
+      <p:sp>
+        <p:nvSpPr>
+          <p:cNvPr id="3" name="Content Placeholder 2"/>
+          <p:cNvSpPr>
+            <a:spLocks noGrp="1"/>
+          </p:cNvSpPr>
+          <p:nvPr>
+            <p:ph idx="1"/>
+          </p:nvPr>
+        </p:nvSpPr>
+        <p:spPr/>
+        <p:txBody>
+          <a:bodyPr/>
+          <a:lstStyle/>
+          <a:p>
+            <a:r>
+              <a:rPr lang="en-GB" dirty="0"/>
+              <a:t>How else might we have pre-processed the data?</a:t>
+            </a:r>
+          </a:p>
+          <a:p>
+            <a:pPr lvl="1"/>
+            <a:r>
+              <a:rPr lang="en-GB" dirty="0"/>
+              <a:t>Clearly this can have big impact on predictor performance!</a:t>
+            </a:r>
+          </a:p>
+          <a:p>
+            <a:r>
+              <a:rPr lang="en-GB" dirty="0"/>
+              <a:t>How else could we choose which features to train on?</a:t>
+            </a:r>
+          </a:p>
+          <a:p>
+            <a:pPr lvl="1"/>
+            <a:r>
+              <a:rPr lang="en-GB" dirty="0"/>
+              <a:t>Features analysis methods</a:t>
+            </a:r>
+          </a:p>
+          <a:p>
+            <a:r>
+              <a:rPr lang="en-GB" dirty="0"/>
+              <a:t>How else could we deal with qualitative data?</a:t>
+            </a:r>
+          </a:p>
+          <a:p>
+            <a:pPr lvl="1"/>
+            <a:r>
+              <a:rPr lang="en-GB" dirty="0"/>
+              <a:t>Other algorithms as well as coding methods</a:t>
+            </a:r>
+          </a:p>
+          <a:p>
+            <a:r>
+              <a:rPr lang="en-GB" dirty="0"/>
+              <a:t>What other learning algorithms might be better suited to this task?</a:t>
+            </a:r>
+          </a:p>
+          <a:p>
+            <a:r>
+              <a:rPr lang="en-GB" dirty="0"/>
+              <a:t>How might our reflections be useful in a business context?</a:t>
+            </a:r>
+          </a:p>
+        </p:txBody>
+      </p:sp>
+    </p:spTree>
+    <p:extLst>
+      <p:ext uri="{BB962C8B-B14F-4D97-AF65-F5344CB8AC3E}">
+        <p14:creationId xmlns:p14="http://schemas.microsoft.com/office/powerpoint/2010/main" val="3299181539"/>
       </p:ext>
     </p:extLst>
   </p:cSld>
@@ -8093,19 +8843,19 @@
           <a:p>
             <a:r>
               <a:rPr lang="en-GB" dirty="0"/>
-              <a:t>What could we predict?</a:t>
-            </a:r>
-          </a:p>
-        </p:txBody>
-      </p:sp>
-      <p:sp>
-        <p:nvSpPr>
-          <p:cNvPr id="3" name="Content Placeholder 2"/>
-          <p:cNvSpPr>
-            <a:spLocks noGrp="1"/>
-          </p:cNvSpPr>
-          <p:nvPr>
-            <p:ph idx="1"/>
+              <a:t>Introductions</a:t>
+            </a:r>
+          </a:p>
+        </p:txBody>
+      </p:sp>
+      <p:sp>
+        <p:nvSpPr>
+          <p:cNvPr id="8" name="Text Placeholder 7"/>
+          <p:cNvSpPr>
+            <a:spLocks noGrp="1"/>
+          </p:cNvSpPr>
+          <p:nvPr>
+            <p:ph type="body" idx="1"/>
           </p:nvPr>
         </p:nvSpPr>
         <p:spPr/>
@@ -8113,43 +8863,14 @@
           <a:bodyPr/>
           <a:lstStyle/>
           <a:p>
-            <a:r>
-              <a:rPr lang="en-GB" dirty="0"/>
-              <a:t>IMDb data set included a huge range of features covering film details, actors &amp; directors, financials etc. </a:t>
-            </a:r>
-          </a:p>
-          <a:p>
-            <a:r>
-              <a:rPr lang="en-GB" dirty="0"/>
-              <a:t>Trying to predict IMDb score seemed too ‘obvious’</a:t>
-            </a:r>
-          </a:p>
-          <a:p>
-            <a:r>
-              <a:rPr lang="en-GB" dirty="0"/>
-              <a:t>Decided on trying to predict the number of Facebook likes a film might receive</a:t>
-            </a:r>
-          </a:p>
-          <a:p>
-            <a:pPr lvl="1"/>
-            <a:r>
-              <a:rPr lang="en-GB" dirty="0"/>
-              <a:t>Social media massively relevant to modern day marketing &amp; advertising</a:t>
-            </a:r>
-          </a:p>
-          <a:p>
-            <a:pPr lvl="1"/>
-            <a:r>
-              <a:rPr lang="en-GB" dirty="0"/>
-              <a:t>Some measure of pervasiveness/pervasiveness and therefore success</a:t>
-            </a:r>
+            <a:endParaRPr lang="en-GB" dirty="0"/>
           </a:p>
         </p:txBody>
       </p:sp>
     </p:spTree>
     <p:extLst>
       <p:ext uri="{BB962C8B-B14F-4D97-AF65-F5344CB8AC3E}">
-        <p14:creationId xmlns:p14="http://schemas.microsoft.com/office/powerpoint/2010/main" val="1290302058"/>
+        <p14:creationId xmlns:p14="http://schemas.microsoft.com/office/powerpoint/2010/main" val="3825795712"/>
       </p:ext>
     </p:extLst>
   </p:cSld>
@@ -8193,14 +8914,7 @@
           <a:p>
             <a:r>
               <a:rPr lang="en-GB" dirty="0"/>
-              <a:t>Where to start?</a:t>
-            </a:r>
-            <a:br>
-              <a:rPr lang="en-GB" dirty="0"/>
-            </a:br>
-            <a:r>
-              <a:rPr lang="en-GB" dirty="0"/>
-              <a:t>Pre-processing the Data</a:t>
+              <a:t>What could we predict?</a:t>
             </a:r>
           </a:p>
         </p:txBody>
@@ -8222,47 +8936,33 @@
           <a:p>
             <a:r>
               <a:rPr lang="en-GB" dirty="0"/>
-              <a:t>Many 0 like entries, some of which definitely incorrect (e.g. Pirates of the Caribbean?!) so deleted all; ~2k data entries!</a:t>
-            </a:r>
-          </a:p>
-          <a:p>
-            <a:r>
-              <a:rPr lang="en-GB" dirty="0"/>
-              <a:t>Facebook likes is a continuous scalar – so need to discretise under pre-defined labels</a:t>
-            </a:r>
-          </a:p>
-          <a:p>
-            <a:r>
-              <a:rPr lang="en-GB" dirty="0"/>
-              <a:t>Wanted to assign ‘Low – Medium – High’ labels based on relative number of likes (bottom 25% = low, top 25% = high)</a:t>
-            </a:r>
-          </a:p>
-          <a:p>
-            <a:r>
-              <a:rPr lang="en-GB" dirty="0"/>
-              <a:t>Applying directly to </a:t>
-            </a:r>
-            <a:r>
-              <a:rPr lang="en-GB" dirty="0" err="1"/>
-              <a:t>facebook</a:t>
-            </a:r>
-            <a:r>
-              <a:rPr lang="en-GB" dirty="0"/>
-              <a:t> likes didn’t work – ended up with too many films in the ‘medium’ category</a:t>
-            </a:r>
-          </a:p>
-          <a:p>
-            <a:r>
-              <a:rPr lang="en-GB" dirty="0"/>
-              <a:t>Instead ranked films based on </a:t>
-            </a:r>
-            <a:r>
-              <a:rPr lang="en-GB" dirty="0" err="1"/>
-              <a:t>facebook</a:t>
-            </a:r>
-            <a:r>
-              <a:rPr lang="en-GB" dirty="0"/>
-              <a:t> likes and applied labels based on those rankings</a:t>
+              <a:t>IMDb data set included a huge range of features covering film details, actors &amp; directors, financials etc. </a:t>
+            </a:r>
+          </a:p>
+          <a:p>
+            <a:r>
+              <a:rPr lang="en-GB" dirty="0"/>
+              <a:t>Each explored something different – Facebook likes, IMDb score &amp; country of origin</a:t>
+            </a:r>
+          </a:p>
+          <a:p>
+            <a:r>
+              <a:rPr lang="en-GB" dirty="0"/>
+              <a:t>Presenting back on trying to predict the number of Facebook likes a film might receive</a:t>
+            </a:r>
+          </a:p>
+          <a:p>
+            <a:pPr lvl="1"/>
+            <a:r>
+              <a:rPr lang="en-GB" dirty="0"/>
+              <a:t>Social media massively relevant to modern day marketing &amp; advertising</a:t>
+            </a:r>
+          </a:p>
+          <a:p>
+            <a:pPr lvl="1"/>
+            <a:r>
+              <a:rPr lang="en-GB" dirty="0"/>
+              <a:t>Some measure of pervasiveness/pervasiveness and therefore success</a:t>
             </a:r>
           </a:p>
         </p:txBody>
@@ -8270,7 +8970,7 @@
     </p:spTree>
     <p:extLst>
       <p:ext uri="{BB962C8B-B14F-4D97-AF65-F5344CB8AC3E}">
-        <p14:creationId xmlns:p14="http://schemas.microsoft.com/office/powerpoint/2010/main" val="1635134680"/>
+        <p14:creationId xmlns:p14="http://schemas.microsoft.com/office/powerpoint/2010/main" val="1290302058"/>
       </p:ext>
     </p:extLst>
   </p:cSld>
@@ -8314,6 +9014,111 @@
           <a:p>
             <a:r>
               <a:rPr lang="en-GB" dirty="0"/>
+              <a:t>Where to start?</a:t>
+            </a:r>
+            <a:br>
+              <a:rPr lang="en-GB" dirty="0"/>
+            </a:br>
+            <a:r>
+              <a:rPr lang="en-GB" dirty="0"/>
+              <a:t>Pre-processing the Data</a:t>
+            </a:r>
+          </a:p>
+        </p:txBody>
+      </p:sp>
+      <p:sp>
+        <p:nvSpPr>
+          <p:cNvPr id="3" name="Content Placeholder 2"/>
+          <p:cNvSpPr>
+            <a:spLocks noGrp="1"/>
+          </p:cNvSpPr>
+          <p:nvPr>
+            <p:ph idx="1"/>
+          </p:nvPr>
+        </p:nvSpPr>
+        <p:spPr/>
+        <p:txBody>
+          <a:bodyPr/>
+          <a:lstStyle/>
+          <a:p>
+            <a:r>
+              <a:rPr lang="en-GB" dirty="0"/>
+              <a:t>Many 0 like entries, some of which definitely incorrect (e.g. Pirates of the Caribbean?!) so deleted all; ~2k data entries!</a:t>
+            </a:r>
+          </a:p>
+          <a:p>
+            <a:r>
+              <a:rPr lang="en-GB" dirty="0"/>
+              <a:t>Facebook likes is a continuous scalar – so need to discretise under pre-defined labels</a:t>
+            </a:r>
+          </a:p>
+          <a:p>
+            <a:r>
+              <a:rPr lang="en-GB" dirty="0"/>
+              <a:t>Wanted to assign ‘Low – Medium – High’ labels based on relative number of likes (bottom 25% = low, top 25% = high)</a:t>
+            </a:r>
+          </a:p>
+          <a:p>
+            <a:r>
+              <a:rPr lang="en-GB" dirty="0"/>
+              <a:t>Applying directly to Facebook likes didn’t work – ended up with too many films in the ‘medium’ category</a:t>
+            </a:r>
+          </a:p>
+          <a:p>
+            <a:r>
+              <a:rPr lang="en-GB" dirty="0"/>
+              <a:t>Instead ranked films based on Facebook likes and applied labels based on those rankings</a:t>
+            </a:r>
+          </a:p>
+        </p:txBody>
+      </p:sp>
+    </p:spTree>
+    <p:extLst>
+      <p:ext uri="{BB962C8B-B14F-4D97-AF65-F5344CB8AC3E}">
+        <p14:creationId xmlns:p14="http://schemas.microsoft.com/office/powerpoint/2010/main" val="1635134680"/>
+      </p:ext>
+    </p:extLst>
+  </p:cSld>
+  <p:clrMapOvr>
+    <a:masterClrMapping/>
+  </p:clrMapOvr>
+</p:sld>
+</file>
+
+<file path=ppt/slides/slide5.xml><?xml version="1.0" encoding="utf-8"?>
+<p:sld xmlns:a="http://schemas.openxmlformats.org/drawingml/2006/main" xmlns:r="http://schemas.openxmlformats.org/officeDocument/2006/relationships" xmlns:p="http://schemas.openxmlformats.org/presentationml/2006/main">
+  <p:cSld>
+    <p:spTree>
+      <p:nvGrpSpPr>
+        <p:cNvPr id="1" name=""/>
+        <p:cNvGrpSpPr/>
+        <p:nvPr/>
+      </p:nvGrpSpPr>
+      <p:grpSpPr>
+        <a:xfrm>
+          <a:off x="0" y="0"/>
+          <a:ext cx="0" cy="0"/>
+          <a:chOff x="0" y="0"/>
+          <a:chExt cx="0" cy="0"/>
+        </a:xfrm>
+      </p:grpSpPr>
+      <p:sp>
+        <p:nvSpPr>
+          <p:cNvPr id="2" name="Title 1"/>
+          <p:cNvSpPr>
+            <a:spLocks noGrp="1"/>
+          </p:cNvSpPr>
+          <p:nvPr>
+            <p:ph type="title"/>
+          </p:nvPr>
+        </p:nvSpPr>
+        <p:spPr/>
+        <p:txBody>
+          <a:bodyPr/>
+          <a:lstStyle/>
+          <a:p>
+            <a:r>
+              <a:rPr lang="en-GB" dirty="0"/>
               <a:t>Ready for a first run</a:t>
             </a:r>
             <a:br>
@@ -8344,6 +9149,17 @@
             <a:r>
               <a:rPr lang="en-GB" dirty="0"/>
               <a:t>Minimum data manipulation for building a KNN classifier:</a:t>
+            </a:r>
+          </a:p>
+          <a:p>
+            <a:pPr lvl="1"/>
+            <a:r>
+              <a:rPr lang="en-GB" dirty="0" err="1"/>
+              <a:t>NaN’s</a:t>
+            </a:r>
+            <a:r>
+              <a:rPr lang="en-GB" dirty="0"/>
+              <a:t> replaced with zeros</a:t>
             </a:r>
           </a:p>
           <a:p>
@@ -8410,7 +9226,7 @@
 </p:sld>
 </file>
 
-<file path=ppt/slides/slide5.xml><?xml version="1.0" encoding="utf-8"?>
+<file path=ppt/slides/slide6.xml><?xml version="1.0" encoding="utf-8"?>
 <p:sld xmlns:a="http://schemas.openxmlformats.org/drawingml/2006/main" xmlns:r="http://schemas.openxmlformats.org/officeDocument/2006/relationships" xmlns:p="http://schemas.openxmlformats.org/presentationml/2006/main">
   <p:cSld>
     <p:spTree>
@@ -8766,7 +9582,7 @@
 </p:sld>
 </file>
 
-<file path=ppt/slides/slide6.xml><?xml version="1.0" encoding="utf-8"?>
+<file path=ppt/slides/slide7.xml><?xml version="1.0" encoding="utf-8"?>
 <p:sld xmlns:a="http://schemas.openxmlformats.org/drawingml/2006/main" xmlns:r="http://schemas.openxmlformats.org/officeDocument/2006/relationships" xmlns:p="http://schemas.openxmlformats.org/presentationml/2006/main">
   <p:cSld>
     <p:spTree>
@@ -8915,7 +9731,7 @@
 </p:sld>
 </file>
 
-<file path=ppt/slides/slide7.xml><?xml version="1.0" encoding="utf-8"?>
+<file path=ppt/slides/slide8.xml><?xml version="1.0" encoding="utf-8"?>
 <p:sld xmlns:a="http://schemas.openxmlformats.org/drawingml/2006/main" xmlns:r="http://schemas.openxmlformats.org/officeDocument/2006/relationships" xmlns:p="http://schemas.openxmlformats.org/presentationml/2006/main">
   <p:cSld>
     <p:spTree>
@@ -9130,187 +9946,6 @@
 </p:sld>
 </file>
 
-<file path=ppt/slides/slide8.xml><?xml version="1.0" encoding="utf-8"?>
-<p:sld xmlns:a="http://schemas.openxmlformats.org/drawingml/2006/main" xmlns:r="http://schemas.openxmlformats.org/officeDocument/2006/relationships" xmlns:p="http://schemas.openxmlformats.org/presentationml/2006/main">
-  <p:cSld>
-    <p:spTree>
-      <p:nvGrpSpPr>
-        <p:cNvPr id="1" name=""/>
-        <p:cNvGrpSpPr/>
-        <p:nvPr/>
-      </p:nvGrpSpPr>
-      <p:grpSpPr>
-        <a:xfrm>
-          <a:off x="0" y="0"/>
-          <a:ext cx="0" cy="0"/>
-          <a:chOff x="0" y="0"/>
-          <a:chExt cx="0" cy="0"/>
-        </a:xfrm>
-      </p:grpSpPr>
-      <p:sp>
-        <p:nvSpPr>
-          <p:cNvPr id="2" name="Title 1"/>
-          <p:cNvSpPr>
-            <a:spLocks noGrp="1"/>
-          </p:cNvSpPr>
-          <p:nvPr>
-            <p:ph type="title"/>
-          </p:nvPr>
-        </p:nvSpPr>
-        <p:spPr/>
-        <p:txBody>
-          <a:bodyPr/>
-          <a:lstStyle/>
-          <a:p>
-            <a:r>
-              <a:rPr lang="en-GB" dirty="0"/>
-              <a:t>How good </a:t>
-            </a:r>
-            <a:r>
-              <a:rPr lang="en-GB" i="1" dirty="0"/>
-              <a:t>really </a:t>
-            </a:r>
-            <a:r>
-              <a:rPr lang="en-GB" dirty="0"/>
-              <a:t>is it?</a:t>
-            </a:r>
-            <a:br>
-              <a:rPr lang="en-GB" dirty="0"/>
-            </a:br>
-            <a:r>
-              <a:rPr lang="en-GB" dirty="0"/>
-              <a:t>Comparing to ‘Chance’</a:t>
-            </a:r>
-          </a:p>
-        </p:txBody>
-      </p:sp>
-      <p:sp>
-        <p:nvSpPr>
-          <p:cNvPr id="3" name="Content Placeholder 2"/>
-          <p:cNvSpPr>
-            <a:spLocks noGrp="1"/>
-          </p:cNvSpPr>
-          <p:nvPr>
-            <p:ph idx="1"/>
-          </p:nvPr>
-        </p:nvSpPr>
-        <p:spPr>
-          <a:xfrm>
-            <a:off x="677334" y="1953195"/>
-            <a:ext cx="8596668" cy="3880773"/>
-          </a:xfrm>
-        </p:spPr>
-        <p:txBody>
-          <a:bodyPr/>
-          <a:lstStyle/>
-          <a:p>
-            <a:r>
-              <a:rPr lang="en-GB" dirty="0"/>
-              <a:t>Pure classifier accuracy isn’t always enough</a:t>
-            </a:r>
-          </a:p>
-          <a:p>
-            <a:pPr lvl="1"/>
-            <a:r>
-              <a:rPr lang="en-GB" dirty="0"/>
-              <a:t>Breast cancer recurrence: always predicting no would be 70% accurate</a:t>
-            </a:r>
-            <a:r>
-              <a:rPr lang="en-GB" baseline="30000" dirty="0"/>
-              <a:t>1</a:t>
-            </a:r>
-          </a:p>
-          <a:p>
-            <a:r>
-              <a:rPr lang="en-GB" dirty="0"/>
-              <a:t>In the Facebook like case, always guessing ‘Medium’ would be ~50% accurate</a:t>
-            </a:r>
-          </a:p>
-          <a:p>
-            <a:pPr lvl="1"/>
-            <a:r>
-              <a:rPr lang="en-GB" dirty="0"/>
-              <a:t>Initially caught us out, you would expect ‘chance’ to be 33% as 3 possible labels</a:t>
-            </a:r>
-          </a:p>
-        </p:txBody>
-      </p:sp>
-      <p:graphicFrame>
-        <p:nvGraphicFramePr>
-          <p:cNvPr id="5" name="Chart 4">
-            <a:extLst>
-              <a:ext uri="{FF2B5EF4-FFF2-40B4-BE49-F238E27FC236}">
-                <a16:creationId xmlns:a16="http://schemas.microsoft.com/office/drawing/2014/main" id="{FC9F8783-F62F-432E-BC26-982FD23AB1E0}"/>
-              </a:ext>
-            </a:extLst>
-          </p:cNvPr>
-          <p:cNvGraphicFramePr>
-            <a:graphicFrameLocks/>
-          </p:cNvGraphicFramePr>
-          <p:nvPr>
-            <p:extLst>
-              <p:ext uri="{D42A27DB-BD31-4B8C-83A1-F6EECF244321}">
-                <p14:modId xmlns:p14="http://schemas.microsoft.com/office/powerpoint/2010/main" val="3446984407"/>
-              </p:ext>
-            </p:extLst>
-          </p:nvPr>
-        </p:nvGraphicFramePr>
-        <p:xfrm>
-          <a:off x="2689668" y="3514974"/>
-          <a:ext cx="4572000" cy="2743200"/>
-        </p:xfrm>
-        <a:graphic>
-          <a:graphicData uri="http://schemas.openxmlformats.org/drawingml/2006/chart">
-            <c:chart xmlns:c="http://schemas.openxmlformats.org/drawingml/2006/chart" xmlns:r="http://schemas.openxmlformats.org/officeDocument/2006/relationships" r:id="rId2"/>
-          </a:graphicData>
-        </a:graphic>
-      </p:graphicFrame>
-      <p:sp>
-        <p:nvSpPr>
-          <p:cNvPr id="6" name="TextBox 5"/>
-          <p:cNvSpPr txBox="1"/>
-          <p:nvPr/>
-        </p:nvSpPr>
-        <p:spPr>
-          <a:xfrm>
-            <a:off x="677334" y="6484420"/>
-            <a:ext cx="7747634" cy="261610"/>
-          </a:xfrm>
-          <a:prstGeom prst="rect">
-            <a:avLst/>
-          </a:prstGeom>
-          <a:noFill/>
-        </p:spPr>
-        <p:txBody>
-          <a:bodyPr wrap="none" rtlCol="0">
-            <a:spAutoFit/>
-          </a:bodyPr>
-          <a:lstStyle/>
-          <a:p>
-            <a:r>
-              <a:rPr lang="en-GB" sz="1100" baseline="30000" dirty="0"/>
-              <a:t>1</a:t>
-            </a:r>
-            <a:r>
-              <a:rPr lang="en-GB" sz="1100" dirty="0"/>
-              <a:t>http://machinelearningmastery.com/classification-accuracy-is-not-enough-more-performance-measures-you-can-use/</a:t>
-            </a:r>
-          </a:p>
-        </p:txBody>
-      </p:sp>
-    </p:spTree>
-    <p:extLst>
-      <p:ext uri="{BB962C8B-B14F-4D97-AF65-F5344CB8AC3E}">
-        <p14:creationId xmlns:p14="http://schemas.microsoft.com/office/powerpoint/2010/main" val="1919603595"/>
-      </p:ext>
-    </p:extLst>
-  </p:cSld>
-  <p:clrMapOvr>
-    <a:masterClrMapping/>
-  </p:clrMapOvr>
-</p:sld>
-</file>
-
 <file path=ppt/slides/slide9.xml><?xml version="1.0" encoding="utf-8"?>
 <p:sld xmlns:a="http://schemas.openxmlformats.org/drawingml/2006/main" xmlns:r="http://schemas.openxmlformats.org/officeDocument/2006/relationships" xmlns:p="http://schemas.openxmlformats.org/presentationml/2006/main">
   <p:cSld>
@@ -9345,113 +9980,84 @@
           <a:p>
             <a:r>
               <a:rPr lang="en-GB" dirty="0"/>
-              <a:t>How else can we check?</a:t>
+              <a:t>Did we miss anything?</a:t>
             </a:r>
             <a:br>
               <a:rPr lang="en-GB" dirty="0"/>
             </a:br>
             <a:r>
               <a:rPr lang="en-GB" dirty="0"/>
-              <a:t>Confusion Matrix</a:t>
-            </a:r>
-          </a:p>
-        </p:txBody>
-      </p:sp>
-      <p:sp>
-        <p:nvSpPr>
-          <p:cNvPr id="5" name="Content Placeholder 4"/>
-          <p:cNvSpPr>
-            <a:spLocks noGrp="1"/>
-          </p:cNvSpPr>
-          <p:nvPr>
-            <p:ph sz="half" idx="1"/>
-          </p:nvPr>
-        </p:nvSpPr>
-        <p:spPr>
-          <a:xfrm>
-            <a:off x="677334" y="2525973"/>
-            <a:ext cx="4184035" cy="3515388"/>
-          </a:xfrm>
-        </p:spPr>
+              <a:t>Further Data Pre-Processing</a:t>
+            </a:r>
+          </a:p>
+        </p:txBody>
+      </p:sp>
+      <p:sp>
+        <p:nvSpPr>
+          <p:cNvPr id="3" name="Content Placeholder 2"/>
+          <p:cNvSpPr>
+            <a:spLocks noGrp="1"/>
+          </p:cNvSpPr>
+          <p:nvPr>
+            <p:ph idx="1"/>
+          </p:nvPr>
+        </p:nvSpPr>
+        <p:spPr/>
         <p:txBody>
           <a:bodyPr/>
           <a:lstStyle/>
           <a:p>
             <a:r>
               <a:rPr lang="en-GB" dirty="0"/>
-              <a:t>Shows misclassifications by label</a:t>
-            </a:r>
-          </a:p>
-          <a:p>
-            <a:r>
-              <a:rPr lang="en-GB" dirty="0"/>
-              <a:t>‘Satisfying’ (?) Reflections:</a:t>
+              <a:t>Took another look at selected features data set</a:t>
+            </a:r>
+          </a:p>
+          <a:p>
+            <a:r>
+              <a:rPr lang="en-GB" dirty="0"/>
+              <a:t>Removed some missing entries for gross</a:t>
+            </a:r>
+          </a:p>
+          <a:p>
+            <a:r>
+              <a:rPr lang="en-GB" dirty="0"/>
+              <a:t>Huge difference in scale of e.g. gross versus number of critic reviews, so normalised all data with respect to their maximum</a:t>
             </a:r>
           </a:p>
           <a:p>
             <a:pPr lvl="1"/>
             <a:r>
               <a:rPr lang="en-GB" dirty="0"/>
-              <a:t>High &amp; low rarely confused</a:t>
+              <a:t>Increased accuracy again to </a:t>
+            </a:r>
+            <a:r>
+              <a:rPr lang="en-GB" b="1" dirty="0"/>
+              <a:t>65.7%</a:t>
+            </a:r>
+          </a:p>
+          <a:p>
+            <a:r>
+              <a:rPr lang="en-GB" dirty="0"/>
+              <a:t>Realised gross in different currencies – removed</a:t>
             </a:r>
           </a:p>
           <a:p>
             <a:pPr lvl="1"/>
             <a:r>
               <a:rPr lang="en-GB" dirty="0"/>
-              <a:t>Medium more often confused with high than with low</a:t>
-            </a:r>
-          </a:p>
-          <a:p>
-            <a:pPr lvl="1"/>
-            <a:r>
-              <a:rPr lang="en-GB" dirty="0"/>
-              <a:t>Most often correct on medium films -&gt; reflection of data set as discussed </a:t>
-            </a:r>
-            <a:r>
-              <a:rPr lang="en-GB" dirty="0" err="1"/>
-              <a:t>prev</a:t>
-            </a:r>
-            <a:r>
-              <a:rPr lang="en-GB" dirty="0"/>
-              <a:t>?</a:t>
-            </a:r>
-          </a:p>
-          <a:p>
-            <a:pPr lvl="1"/>
-            <a:endParaRPr lang="en-GB" dirty="0"/>
-          </a:p>
-        </p:txBody>
-      </p:sp>
-      <p:pic>
-        <p:nvPicPr>
-          <p:cNvPr id="7" name="Content Placeholder 6"/>
-          <p:cNvPicPr>
-            <a:picLocks noGrp="1" noChangeAspect="1"/>
-          </p:cNvPicPr>
-          <p:nvPr>
-            <p:ph sz="half" idx="2"/>
-          </p:nvPr>
-        </p:nvPicPr>
-        <p:blipFill rotWithShape="1">
-          <a:blip r:embed="rId2"/>
-          <a:srcRect l="14334" t="33037" r="42500" b="9185"/>
-          <a:stretch/>
-        </p:blipFill>
-        <p:spPr>
-          <a:xfrm>
-            <a:off x="5089525" y="2497692"/>
-            <a:ext cx="4184650" cy="3150666"/>
-          </a:xfrm>
-          <a:prstGeom prst="rect">
-            <a:avLst/>
-          </a:prstGeom>
-        </p:spPr>
-      </p:pic>
+              <a:t>Increased accuracy again to final value of </a:t>
+            </a:r>
+            <a:r>
+              <a:rPr lang="en-GB" b="1" dirty="0"/>
+              <a:t>67.9%</a:t>
+            </a:r>
+          </a:p>
+        </p:txBody>
+      </p:sp>
     </p:spTree>
     <p:extLst>
       <p:ext uri="{BB962C8B-B14F-4D97-AF65-F5344CB8AC3E}">
-        <p14:creationId xmlns:p14="http://schemas.microsoft.com/office/powerpoint/2010/main" val="3867991754"/>
+        <p14:creationId xmlns:p14="http://schemas.microsoft.com/office/powerpoint/2010/main" val="1546654045"/>
       </p:ext>
     </p:extLst>
   </p:cSld>

</xml_diff>